<commit_message>
Updating API DI to use deployed server rather than local.
</commit_message>
<xml_diff>
--- a/Introduction to the Microsoft Bot Framework.pptx
+++ b/Introduction to the Microsoft Bot Framework.pptx
@@ -583,6 +583,222 @@
 </file>
 
 <file path=ppt/notesSlides/notesSlide2.xml><?xml version="1.0" encoding="utf-8"?>
+<p:notes xmlns:a="http://schemas.openxmlformats.org/drawingml/2006/main" xmlns:r="http://schemas.openxmlformats.org/officeDocument/2006/relationships" xmlns:p="http://schemas.openxmlformats.org/presentationml/2006/main">
+  <p:cSld>
+    <p:spTree>
+      <p:nvGrpSpPr>
+        <p:cNvPr id="1" name=""/>
+        <p:cNvGrpSpPr/>
+        <p:nvPr/>
+      </p:nvGrpSpPr>
+      <p:grpSpPr>
+        <a:xfrm>
+          <a:off x="0" y="0"/>
+          <a:ext cx="0" cy="0"/>
+          <a:chOff x="0" y="0"/>
+          <a:chExt cx="0" cy="0"/>
+        </a:xfrm>
+      </p:grpSpPr>
+      <p:sp>
+        <p:nvSpPr>
+          <p:cNvPr id="2" name="Slide Image Placeholder 1"/>
+          <p:cNvSpPr>
+            <a:spLocks noGrp="1" noRot="1" noChangeAspect="1"/>
+          </p:cNvSpPr>
+          <p:nvPr>
+            <p:ph type="sldImg"/>
+          </p:nvPr>
+        </p:nvSpPr>
+        <p:spPr/>
+      </p:sp>
+      <p:sp>
+        <p:nvSpPr>
+          <p:cNvPr id="3" name="Notes Placeholder 2"/>
+          <p:cNvSpPr>
+            <a:spLocks noGrp="1"/>
+          </p:cNvSpPr>
+          <p:nvPr>
+            <p:ph type="body" idx="1"/>
+          </p:nvPr>
+        </p:nvSpPr>
+        <p:spPr/>
+        <p:txBody>
+          <a:bodyPr/>
+          <a:lstStyle/>
+          <a:p>
+            <a:r>
+              <a:rPr lang="en-AU" dirty="0"/>
+              <a:t>Add “where conference”:</a:t>
+            </a:r>
+          </a:p>
+          <a:p>
+            <a:r>
+              <a:rPr lang="en-AU" dirty="0"/>
+              <a:t>	“Where is the conference this year?” – The Perth Convention and Exhibition Centre</a:t>
+            </a:r>
+          </a:p>
+          <a:p>
+            <a:pPr marL="0" marR="0" lvl="0" indent="0" algn="l" defTabSz="914400" rtl="0" eaLnBrk="1" fontAlgn="auto" latinLnBrk="0" hangingPunct="1">
+              <a:lnSpc>
+                <a:spcPct val="100000"/>
+              </a:lnSpc>
+              <a:spcBef>
+                <a:spcPts val="0"/>
+              </a:spcBef>
+              <a:spcAft>
+                <a:spcPts val="0"/>
+              </a:spcAft>
+              <a:buClrTx/>
+              <a:buSzTx/>
+              <a:buFontTx/>
+              <a:buNone/>
+              <a:tabLst/>
+              <a:defRPr/>
+            </a:pPr>
+            <a:r>
+              <a:rPr lang="en-AU" dirty="0"/>
+              <a:t>	“Where is the conference?” – The Perth Convention and Exhibition Centre</a:t>
+            </a:r>
+          </a:p>
+          <a:p>
+            <a:pPr marL="0" marR="0" lvl="0" indent="0" algn="l" defTabSz="914400" rtl="0" eaLnBrk="1" fontAlgn="auto" latinLnBrk="0" hangingPunct="1">
+              <a:lnSpc>
+                <a:spcPct val="100000"/>
+              </a:lnSpc>
+              <a:spcBef>
+                <a:spcPts val="0"/>
+              </a:spcBef>
+              <a:spcAft>
+                <a:spcPts val="0"/>
+              </a:spcAft>
+              <a:buClrTx/>
+              <a:buSzTx/>
+              <a:buFontTx/>
+              <a:buNone/>
+              <a:tabLst/>
+              <a:defRPr/>
+            </a:pPr>
+            <a:r>
+              <a:rPr lang="en-AU" dirty="0"/>
+              <a:t>	“Where?” - The Perth Convention and Exhibition Centre</a:t>
+            </a:r>
+          </a:p>
+          <a:p>
+            <a:pPr marL="0" marR="0" lvl="0" indent="0" algn="l" defTabSz="914400" rtl="0" eaLnBrk="1" fontAlgn="auto" latinLnBrk="0" hangingPunct="1">
+              <a:lnSpc>
+                <a:spcPct val="100000"/>
+              </a:lnSpc>
+              <a:spcBef>
+                <a:spcPts val="0"/>
+              </a:spcBef>
+              <a:spcAft>
+                <a:spcPts val="0"/>
+              </a:spcAft>
+              <a:buClrTx/>
+              <a:buSzTx/>
+              <a:buFontTx/>
+              <a:buNone/>
+              <a:tabLst/>
+              <a:defRPr/>
+            </a:pPr>
+            <a:endParaRPr lang="en-AU" dirty="0"/>
+          </a:p>
+          <a:p>
+            <a:pPr marL="0" marR="0" lvl="0" indent="0" algn="l" defTabSz="914400" rtl="0" eaLnBrk="1" fontAlgn="auto" latinLnBrk="0" hangingPunct="1">
+              <a:lnSpc>
+                <a:spcPct val="100000"/>
+              </a:lnSpc>
+              <a:spcBef>
+                <a:spcPts val="0"/>
+              </a:spcBef>
+              <a:spcAft>
+                <a:spcPts val="0"/>
+              </a:spcAft>
+              <a:buClrTx/>
+              <a:buSzTx/>
+              <a:buFontTx/>
+              <a:buNone/>
+              <a:tabLst/>
+              <a:defRPr/>
+            </a:pPr>
+            <a:r>
+              <a:rPr lang="en-AU" dirty="0"/>
+              <a:t>Add “when” questions:</a:t>
+            </a:r>
+          </a:p>
+          <a:p>
+            <a:pPr marL="0" marR="0" lvl="0" indent="0" algn="l" defTabSz="914400" rtl="0" eaLnBrk="1" fontAlgn="auto" latinLnBrk="0" hangingPunct="1">
+              <a:lnSpc>
+                <a:spcPct val="100000"/>
+              </a:lnSpc>
+              <a:spcBef>
+                <a:spcPts val="0"/>
+              </a:spcBef>
+              <a:spcAft>
+                <a:spcPts val="0"/>
+              </a:spcAft>
+              <a:buClrTx/>
+              <a:buSzTx/>
+              <a:buFontTx/>
+              <a:buNone/>
+              <a:tabLst/>
+              <a:defRPr/>
+            </a:pPr>
+            <a:r>
+              <a:rPr lang="en-AU" dirty="0"/>
+              <a:t>	When – 16</a:t>
+            </a:r>
+            <a:r>
+              <a:rPr lang="en-AU" baseline="30000" dirty="0"/>
+              <a:t>th</a:t>
+            </a:r>
+            <a:r>
+              <a:rPr lang="en-AU" dirty="0"/>
+              <a:t> September 2017</a:t>
+            </a:r>
+          </a:p>
+          <a:p>
+            <a:endParaRPr lang="en-AU" dirty="0"/>
+          </a:p>
+        </p:txBody>
+      </p:sp>
+      <p:sp>
+        <p:nvSpPr>
+          <p:cNvPr id="4" name="Slide Number Placeholder 3"/>
+          <p:cNvSpPr>
+            <a:spLocks noGrp="1"/>
+          </p:cNvSpPr>
+          <p:nvPr>
+            <p:ph type="sldNum" sz="quarter" idx="10"/>
+          </p:nvPr>
+        </p:nvSpPr>
+        <p:spPr/>
+        <p:txBody>
+          <a:bodyPr/>
+          <a:lstStyle/>
+          <a:p>
+            <a:fld id="{B0963970-F77D-4550-9FC6-19F442B9E04B}" type="slidenum">
+              <a:rPr lang="en-AU" smtClean="0"/>
+              <a:t>24</a:t>
+            </a:fld>
+            <a:endParaRPr lang="en-AU"/>
+          </a:p>
+        </p:txBody>
+      </p:sp>
+    </p:spTree>
+    <p:extLst>
+      <p:ext uri="{BB962C8B-B14F-4D97-AF65-F5344CB8AC3E}">
+        <p14:creationId xmlns:p14="http://schemas.microsoft.com/office/powerpoint/2010/main" val="2818304037"/>
+      </p:ext>
+    </p:extLst>
+  </p:cSld>
+  <p:clrMapOvr>
+    <a:masterClrMapping/>
+  </p:clrMapOvr>
+</p:notes>
+</file>
+
+<file path=ppt/notesSlides/notesSlide3.xml><?xml version="1.0" encoding="utf-8"?>
 <p:notes xmlns:a="http://schemas.openxmlformats.org/drawingml/2006/main" xmlns:r="http://schemas.openxmlformats.org/officeDocument/2006/relationships" xmlns:p="http://schemas.openxmlformats.org/presentationml/2006/main">
   <p:cSld>
     <p:spTree>

</xml_diff>

<commit_message>
Updating data used in LUIS model to have all speakers - one day I will do the sessions.
</commit_message>
<xml_diff>
--- a/Introduction to the Microsoft Bot Framework.pptx
+++ b/Introduction to the Microsoft Bot Framework.pptx
@@ -5,7 +5,7 @@
     <p:sldMasterId id="2147483648" r:id="rId1"/>
   </p:sldMasterIdLst>
   <p:notesMasterIdLst>
-    <p:notesMasterId r:id="rId31"/>
+    <p:notesMasterId r:id="rId32"/>
   </p:notesMasterIdLst>
   <p:sldIdLst>
     <p:sldId id="256" r:id="rId2"/>
@@ -35,8 +35,9 @@
     <p:sldId id="287" r:id="rId26"/>
     <p:sldId id="275" r:id="rId27"/>
     <p:sldId id="277" r:id="rId28"/>
-    <p:sldId id="278" r:id="rId29"/>
-    <p:sldId id="288" r:id="rId30"/>
+    <p:sldId id="291" r:id="rId29"/>
+    <p:sldId id="278" r:id="rId30"/>
+    <p:sldId id="288" r:id="rId31"/>
   </p:sldIdLst>
   <p:sldSz cx="12192000" cy="6858000"/>
   <p:notesSz cx="6858000" cy="9144000"/>
@@ -628,138 +629,6 @@
           <a:bodyPr/>
           <a:lstStyle/>
           <a:p>
-            <a:r>
-              <a:rPr lang="en-AU" dirty="0"/>
-              <a:t>Add “where conference”:</a:t>
-            </a:r>
-          </a:p>
-          <a:p>
-            <a:r>
-              <a:rPr lang="en-AU" dirty="0"/>
-              <a:t>	“Where is the conference this year?” – The Perth Convention and Exhibition Centre</a:t>
-            </a:r>
-          </a:p>
-          <a:p>
-            <a:pPr marL="0" marR="0" lvl="0" indent="0" algn="l" defTabSz="914400" rtl="0" eaLnBrk="1" fontAlgn="auto" latinLnBrk="0" hangingPunct="1">
-              <a:lnSpc>
-                <a:spcPct val="100000"/>
-              </a:lnSpc>
-              <a:spcBef>
-                <a:spcPts val="0"/>
-              </a:spcBef>
-              <a:spcAft>
-                <a:spcPts val="0"/>
-              </a:spcAft>
-              <a:buClrTx/>
-              <a:buSzTx/>
-              <a:buFontTx/>
-              <a:buNone/>
-              <a:tabLst/>
-              <a:defRPr/>
-            </a:pPr>
-            <a:r>
-              <a:rPr lang="en-AU" dirty="0"/>
-              <a:t>	“Where is the conference?” – The Perth Convention and Exhibition Centre</a:t>
-            </a:r>
-          </a:p>
-          <a:p>
-            <a:pPr marL="0" marR="0" lvl="0" indent="0" algn="l" defTabSz="914400" rtl="0" eaLnBrk="1" fontAlgn="auto" latinLnBrk="0" hangingPunct="1">
-              <a:lnSpc>
-                <a:spcPct val="100000"/>
-              </a:lnSpc>
-              <a:spcBef>
-                <a:spcPts val="0"/>
-              </a:spcBef>
-              <a:spcAft>
-                <a:spcPts val="0"/>
-              </a:spcAft>
-              <a:buClrTx/>
-              <a:buSzTx/>
-              <a:buFontTx/>
-              <a:buNone/>
-              <a:tabLst/>
-              <a:defRPr/>
-            </a:pPr>
-            <a:r>
-              <a:rPr lang="en-AU" dirty="0"/>
-              <a:t>	“Where?” - The Perth Convention and Exhibition Centre</a:t>
-            </a:r>
-          </a:p>
-          <a:p>
-            <a:pPr marL="0" marR="0" lvl="0" indent="0" algn="l" defTabSz="914400" rtl="0" eaLnBrk="1" fontAlgn="auto" latinLnBrk="0" hangingPunct="1">
-              <a:lnSpc>
-                <a:spcPct val="100000"/>
-              </a:lnSpc>
-              <a:spcBef>
-                <a:spcPts val="0"/>
-              </a:spcBef>
-              <a:spcAft>
-                <a:spcPts val="0"/>
-              </a:spcAft>
-              <a:buClrTx/>
-              <a:buSzTx/>
-              <a:buFontTx/>
-              <a:buNone/>
-              <a:tabLst/>
-              <a:defRPr/>
-            </a:pPr>
-            <a:endParaRPr lang="en-AU" dirty="0"/>
-          </a:p>
-          <a:p>
-            <a:pPr marL="0" marR="0" lvl="0" indent="0" algn="l" defTabSz="914400" rtl="0" eaLnBrk="1" fontAlgn="auto" latinLnBrk="0" hangingPunct="1">
-              <a:lnSpc>
-                <a:spcPct val="100000"/>
-              </a:lnSpc>
-              <a:spcBef>
-                <a:spcPts val="0"/>
-              </a:spcBef>
-              <a:spcAft>
-                <a:spcPts val="0"/>
-              </a:spcAft>
-              <a:buClrTx/>
-              <a:buSzTx/>
-              <a:buFontTx/>
-              <a:buNone/>
-              <a:tabLst/>
-              <a:defRPr/>
-            </a:pPr>
-            <a:r>
-              <a:rPr lang="en-AU" dirty="0"/>
-              <a:t>Add “when” questions:</a:t>
-            </a:r>
-          </a:p>
-          <a:p>
-            <a:pPr marL="0" marR="0" lvl="0" indent="0" algn="l" defTabSz="914400" rtl="0" eaLnBrk="1" fontAlgn="auto" latinLnBrk="0" hangingPunct="1">
-              <a:lnSpc>
-                <a:spcPct val="100000"/>
-              </a:lnSpc>
-              <a:spcBef>
-                <a:spcPts val="0"/>
-              </a:spcBef>
-              <a:spcAft>
-                <a:spcPts val="0"/>
-              </a:spcAft>
-              <a:buClrTx/>
-              <a:buSzTx/>
-              <a:buFontTx/>
-              <a:buNone/>
-              <a:tabLst/>
-              <a:defRPr/>
-            </a:pPr>
-            <a:r>
-              <a:rPr lang="en-AU" dirty="0"/>
-              <a:t>	When – 16</a:t>
-            </a:r>
-            <a:r>
-              <a:rPr lang="en-AU" baseline="30000" dirty="0"/>
-              <a:t>th</a:t>
-            </a:r>
-            <a:r>
-              <a:rPr lang="en-AU" dirty="0"/>
-              <a:t> September 2017</a:t>
-            </a:r>
-          </a:p>
-          <a:p>
             <a:endParaRPr lang="en-AU" dirty="0"/>
           </a:p>
         </p:txBody>
@@ -781,7 +650,7 @@
           <a:p>
             <a:fld id="{B0963970-F77D-4550-9FC6-19F442B9E04B}" type="slidenum">
               <a:rPr lang="en-AU" smtClean="0"/>
-              <a:t>25</a:t>
+              <a:t>24</a:t>
             </a:fld>
             <a:endParaRPr lang="en-AU"/>
           </a:p>
@@ -790,7 +659,7 @@
     </p:spTree>
     <p:extLst>
       <p:ext uri="{BB962C8B-B14F-4D97-AF65-F5344CB8AC3E}">
-        <p14:creationId xmlns:p14="http://schemas.microsoft.com/office/powerpoint/2010/main" val="2818304037"/>
+        <p14:creationId xmlns:p14="http://schemas.microsoft.com/office/powerpoint/2010/main" val="3664956494"/>
       </p:ext>
     </p:extLst>
   </p:cSld>
@@ -846,6 +715,222 @@
           <a:p>
             <a:r>
               <a:rPr lang="en-AU" dirty="0"/>
+              <a:t>Add “where conference”:</a:t>
+            </a:r>
+          </a:p>
+          <a:p>
+            <a:r>
+              <a:rPr lang="en-AU" dirty="0"/>
+              <a:t>	“Where is the conference this year?” – The Perth Convention and Exhibition Centre</a:t>
+            </a:r>
+          </a:p>
+          <a:p>
+            <a:pPr marL="0" marR="0" lvl="0" indent="0" algn="l" defTabSz="914400" rtl="0" eaLnBrk="1" fontAlgn="auto" latinLnBrk="0" hangingPunct="1">
+              <a:lnSpc>
+                <a:spcPct val="100000"/>
+              </a:lnSpc>
+              <a:spcBef>
+                <a:spcPts val="0"/>
+              </a:spcBef>
+              <a:spcAft>
+                <a:spcPts val="0"/>
+              </a:spcAft>
+              <a:buClrTx/>
+              <a:buSzTx/>
+              <a:buFontTx/>
+              <a:buNone/>
+              <a:tabLst/>
+              <a:defRPr/>
+            </a:pPr>
+            <a:r>
+              <a:rPr lang="en-AU" dirty="0"/>
+              <a:t>	“Where is the conference?” – The Perth Convention and Exhibition Centre</a:t>
+            </a:r>
+          </a:p>
+          <a:p>
+            <a:pPr marL="0" marR="0" lvl="0" indent="0" algn="l" defTabSz="914400" rtl="0" eaLnBrk="1" fontAlgn="auto" latinLnBrk="0" hangingPunct="1">
+              <a:lnSpc>
+                <a:spcPct val="100000"/>
+              </a:lnSpc>
+              <a:spcBef>
+                <a:spcPts val="0"/>
+              </a:spcBef>
+              <a:spcAft>
+                <a:spcPts val="0"/>
+              </a:spcAft>
+              <a:buClrTx/>
+              <a:buSzTx/>
+              <a:buFontTx/>
+              <a:buNone/>
+              <a:tabLst/>
+              <a:defRPr/>
+            </a:pPr>
+            <a:r>
+              <a:rPr lang="en-AU" dirty="0"/>
+              <a:t>	“Where?” - The Perth Convention and Exhibition Centre</a:t>
+            </a:r>
+          </a:p>
+          <a:p>
+            <a:pPr marL="0" marR="0" lvl="0" indent="0" algn="l" defTabSz="914400" rtl="0" eaLnBrk="1" fontAlgn="auto" latinLnBrk="0" hangingPunct="1">
+              <a:lnSpc>
+                <a:spcPct val="100000"/>
+              </a:lnSpc>
+              <a:spcBef>
+                <a:spcPts val="0"/>
+              </a:spcBef>
+              <a:spcAft>
+                <a:spcPts val="0"/>
+              </a:spcAft>
+              <a:buClrTx/>
+              <a:buSzTx/>
+              <a:buFontTx/>
+              <a:buNone/>
+              <a:tabLst/>
+              <a:defRPr/>
+            </a:pPr>
+            <a:endParaRPr lang="en-AU" dirty="0"/>
+          </a:p>
+          <a:p>
+            <a:pPr marL="0" marR="0" lvl="0" indent="0" algn="l" defTabSz="914400" rtl="0" eaLnBrk="1" fontAlgn="auto" latinLnBrk="0" hangingPunct="1">
+              <a:lnSpc>
+                <a:spcPct val="100000"/>
+              </a:lnSpc>
+              <a:spcBef>
+                <a:spcPts val="0"/>
+              </a:spcBef>
+              <a:spcAft>
+                <a:spcPts val="0"/>
+              </a:spcAft>
+              <a:buClrTx/>
+              <a:buSzTx/>
+              <a:buFontTx/>
+              <a:buNone/>
+              <a:tabLst/>
+              <a:defRPr/>
+            </a:pPr>
+            <a:r>
+              <a:rPr lang="en-AU" dirty="0"/>
+              <a:t>Add “when” questions:</a:t>
+            </a:r>
+          </a:p>
+          <a:p>
+            <a:pPr marL="0" marR="0" lvl="0" indent="0" algn="l" defTabSz="914400" rtl="0" eaLnBrk="1" fontAlgn="auto" latinLnBrk="0" hangingPunct="1">
+              <a:lnSpc>
+                <a:spcPct val="100000"/>
+              </a:lnSpc>
+              <a:spcBef>
+                <a:spcPts val="0"/>
+              </a:spcBef>
+              <a:spcAft>
+                <a:spcPts val="0"/>
+              </a:spcAft>
+              <a:buClrTx/>
+              <a:buSzTx/>
+              <a:buFontTx/>
+              <a:buNone/>
+              <a:tabLst/>
+              <a:defRPr/>
+            </a:pPr>
+            <a:r>
+              <a:rPr lang="en-AU" dirty="0"/>
+              <a:t>	When – 16</a:t>
+            </a:r>
+            <a:r>
+              <a:rPr lang="en-AU" baseline="30000" dirty="0"/>
+              <a:t>th</a:t>
+            </a:r>
+            <a:r>
+              <a:rPr lang="en-AU" dirty="0"/>
+              <a:t> September 2017</a:t>
+            </a:r>
+          </a:p>
+          <a:p>
+            <a:endParaRPr lang="en-AU" dirty="0"/>
+          </a:p>
+        </p:txBody>
+      </p:sp>
+      <p:sp>
+        <p:nvSpPr>
+          <p:cNvPr id="4" name="Slide Number Placeholder 3"/>
+          <p:cNvSpPr>
+            <a:spLocks noGrp="1"/>
+          </p:cNvSpPr>
+          <p:nvPr>
+            <p:ph type="sldNum" sz="quarter" idx="10"/>
+          </p:nvPr>
+        </p:nvSpPr>
+        <p:spPr/>
+        <p:txBody>
+          <a:bodyPr/>
+          <a:lstStyle/>
+          <a:p>
+            <a:fld id="{B0963970-F77D-4550-9FC6-19F442B9E04B}" type="slidenum">
+              <a:rPr lang="en-AU" smtClean="0"/>
+              <a:t>25</a:t>
+            </a:fld>
+            <a:endParaRPr lang="en-AU"/>
+          </a:p>
+        </p:txBody>
+      </p:sp>
+    </p:spTree>
+    <p:extLst>
+      <p:ext uri="{BB962C8B-B14F-4D97-AF65-F5344CB8AC3E}">
+        <p14:creationId xmlns:p14="http://schemas.microsoft.com/office/powerpoint/2010/main" val="2818304037"/>
+      </p:ext>
+    </p:extLst>
+  </p:cSld>
+  <p:clrMapOvr>
+    <a:masterClrMapping/>
+  </p:clrMapOvr>
+</p:notes>
+</file>
+
+<file path=ppt/notesSlides/notesSlide4.xml><?xml version="1.0" encoding="utf-8"?>
+<p:notes xmlns:a="http://schemas.openxmlformats.org/drawingml/2006/main" xmlns:r="http://schemas.openxmlformats.org/officeDocument/2006/relationships" xmlns:p="http://schemas.openxmlformats.org/presentationml/2006/main">
+  <p:cSld>
+    <p:spTree>
+      <p:nvGrpSpPr>
+        <p:cNvPr id="1" name=""/>
+        <p:cNvGrpSpPr/>
+        <p:nvPr/>
+      </p:nvGrpSpPr>
+      <p:grpSpPr>
+        <a:xfrm>
+          <a:off x="0" y="0"/>
+          <a:ext cx="0" cy="0"/>
+          <a:chOff x="0" y="0"/>
+          <a:chExt cx="0" cy="0"/>
+        </a:xfrm>
+      </p:grpSpPr>
+      <p:sp>
+        <p:nvSpPr>
+          <p:cNvPr id="2" name="Slide Image Placeholder 1"/>
+          <p:cNvSpPr>
+            <a:spLocks noGrp="1" noRot="1" noChangeAspect="1"/>
+          </p:cNvSpPr>
+          <p:nvPr>
+            <p:ph type="sldImg"/>
+          </p:nvPr>
+        </p:nvSpPr>
+        <p:spPr/>
+      </p:sp>
+      <p:sp>
+        <p:nvSpPr>
+          <p:cNvPr id="3" name="Notes Placeholder 2"/>
+          <p:cNvSpPr>
+            <a:spLocks noGrp="1"/>
+          </p:cNvSpPr>
+          <p:nvPr>
+            <p:ph type="body" idx="1"/>
+          </p:nvPr>
+        </p:nvSpPr>
+        <p:spPr/>
+        <p:txBody>
+          <a:bodyPr/>
+          <a:lstStyle/>
+          <a:p>
+            <a:r>
+              <a:rPr lang="en-AU" dirty="0"/>
               <a:t>Don’t go all NLP, it’s best as “glue” between “on rails” conversations.</a:t>
             </a:r>
           </a:p>
@@ -878,6 +963,229 @@
     <p:extLst>
       <p:ext uri="{BB962C8B-B14F-4D97-AF65-F5344CB8AC3E}">
         <p14:creationId xmlns:p14="http://schemas.microsoft.com/office/powerpoint/2010/main" val="465390605"/>
+      </p:ext>
+    </p:extLst>
+  </p:cSld>
+  <p:clrMapOvr>
+    <a:masterClrMapping/>
+  </p:clrMapOvr>
+</p:notes>
+</file>
+
+<file path=ppt/notesSlides/notesSlide5.xml><?xml version="1.0" encoding="utf-8"?>
+<p:notes xmlns:a="http://schemas.openxmlformats.org/drawingml/2006/main" xmlns:r="http://schemas.openxmlformats.org/officeDocument/2006/relationships" xmlns:p="http://schemas.openxmlformats.org/presentationml/2006/main">
+  <p:cSld>
+    <p:spTree>
+      <p:nvGrpSpPr>
+        <p:cNvPr id="1" name=""/>
+        <p:cNvGrpSpPr/>
+        <p:nvPr/>
+      </p:nvGrpSpPr>
+      <p:grpSpPr>
+        <a:xfrm>
+          <a:off x="0" y="0"/>
+          <a:ext cx="0" cy="0"/>
+          <a:chOff x="0" y="0"/>
+          <a:chExt cx="0" cy="0"/>
+        </a:xfrm>
+      </p:grpSpPr>
+      <p:sp>
+        <p:nvSpPr>
+          <p:cNvPr id="2" name="Slide Image Placeholder 1"/>
+          <p:cNvSpPr>
+            <a:spLocks noGrp="1" noRot="1" noChangeAspect="1"/>
+          </p:cNvSpPr>
+          <p:nvPr>
+            <p:ph type="sldImg"/>
+          </p:nvPr>
+        </p:nvSpPr>
+        <p:spPr/>
+      </p:sp>
+      <p:sp>
+        <p:nvSpPr>
+          <p:cNvPr id="3" name="Notes Placeholder 2"/>
+          <p:cNvSpPr>
+            <a:spLocks noGrp="1"/>
+          </p:cNvSpPr>
+          <p:nvPr>
+            <p:ph type="body" idx="1"/>
+          </p:nvPr>
+        </p:nvSpPr>
+        <p:spPr/>
+        <p:txBody>
+          <a:bodyPr/>
+          <a:lstStyle/>
+          <a:p>
+            <a:r>
+              <a:rPr lang="en-AU" dirty="0"/>
+              <a:t>Add a weather example – weather for different cities with entities.</a:t>
+            </a:r>
+          </a:p>
+          <a:p>
+            <a:endParaRPr lang="en-AU" dirty="0"/>
+          </a:p>
+        </p:txBody>
+      </p:sp>
+      <p:sp>
+        <p:nvSpPr>
+          <p:cNvPr id="4" name="Slide Number Placeholder 3"/>
+          <p:cNvSpPr>
+            <a:spLocks noGrp="1"/>
+          </p:cNvSpPr>
+          <p:nvPr>
+            <p:ph type="sldNum" sz="quarter" idx="10"/>
+          </p:nvPr>
+        </p:nvSpPr>
+        <p:spPr/>
+        <p:txBody>
+          <a:bodyPr/>
+          <a:lstStyle/>
+          <a:p>
+            <a:fld id="{B0963970-F77D-4550-9FC6-19F442B9E04B}" type="slidenum">
+              <a:rPr lang="en-AU" smtClean="0"/>
+              <a:t>27</a:t>
+            </a:fld>
+            <a:endParaRPr lang="en-AU"/>
+          </a:p>
+        </p:txBody>
+      </p:sp>
+    </p:spTree>
+    <p:extLst>
+      <p:ext uri="{BB962C8B-B14F-4D97-AF65-F5344CB8AC3E}">
+        <p14:creationId xmlns:p14="http://schemas.microsoft.com/office/powerpoint/2010/main" val="2575954203"/>
+      </p:ext>
+    </p:extLst>
+  </p:cSld>
+  <p:clrMapOvr>
+    <a:masterClrMapping/>
+  </p:clrMapOvr>
+</p:notes>
+</file>
+
+<file path=ppt/notesSlides/notesSlide6.xml><?xml version="1.0" encoding="utf-8"?>
+<p:notes xmlns:a="http://schemas.openxmlformats.org/drawingml/2006/main" xmlns:r="http://schemas.openxmlformats.org/officeDocument/2006/relationships" xmlns:p="http://schemas.openxmlformats.org/presentationml/2006/main">
+  <p:cSld>
+    <p:spTree>
+      <p:nvGrpSpPr>
+        <p:cNvPr id="1" name=""/>
+        <p:cNvGrpSpPr/>
+        <p:nvPr/>
+      </p:nvGrpSpPr>
+      <p:grpSpPr>
+        <a:xfrm>
+          <a:off x="0" y="0"/>
+          <a:ext cx="0" cy="0"/>
+          <a:chOff x="0" y="0"/>
+          <a:chExt cx="0" cy="0"/>
+        </a:xfrm>
+      </p:grpSpPr>
+      <p:sp>
+        <p:nvSpPr>
+          <p:cNvPr id="2" name="Slide Image Placeholder 1"/>
+          <p:cNvSpPr>
+            <a:spLocks noGrp="1" noRot="1" noChangeAspect="1"/>
+          </p:cNvSpPr>
+          <p:nvPr>
+            <p:ph type="sldImg"/>
+          </p:nvPr>
+        </p:nvSpPr>
+        <p:spPr/>
+      </p:sp>
+      <p:sp>
+        <p:nvSpPr>
+          <p:cNvPr id="3" name="Notes Placeholder 2"/>
+          <p:cNvSpPr>
+            <a:spLocks noGrp="1"/>
+          </p:cNvSpPr>
+          <p:nvPr>
+            <p:ph type="body" idx="1"/>
+          </p:nvPr>
+        </p:nvSpPr>
+        <p:spPr/>
+        <p:txBody>
+          <a:bodyPr/>
+          <a:lstStyle/>
+          <a:p>
+            <a:pPr marL="0" marR="0" lvl="0" indent="0" algn="l" defTabSz="914400" rtl="0" eaLnBrk="1" fontAlgn="auto" latinLnBrk="0" hangingPunct="1">
+              <a:lnSpc>
+                <a:spcPct val="100000"/>
+              </a:lnSpc>
+              <a:spcBef>
+                <a:spcPts val="0"/>
+              </a:spcBef>
+              <a:spcAft>
+                <a:spcPts val="0"/>
+              </a:spcAft>
+              <a:buClrTx/>
+              <a:buSzTx/>
+              <a:buFontTx/>
+              <a:buNone/>
+              <a:tabLst/>
+              <a:defRPr/>
+            </a:pPr>
+            <a:r>
+              <a:rPr lang="en-AU" dirty="0"/>
+              <a:t>POS Tagging – disambiguate meanings (nouns vs. verbs) e.g. charge  -  (Bag of Words, LDA, word2vec) </a:t>
+            </a:r>
+          </a:p>
+          <a:p>
+            <a:r>
+              <a:rPr lang="en-AU" dirty="0"/>
+              <a:t>Lemmatization – canonical form of the word, lemmatization uses vocabulary and morphological analysis, stemming is a crude heuristic process</a:t>
+            </a:r>
+          </a:p>
+          <a:p>
+            <a:r>
+              <a:rPr lang="en-AU" dirty="0"/>
+              <a:t>Concept Recognition – domain specific vocabulary, e.g. breed of dog</a:t>
+            </a:r>
+          </a:p>
+          <a:p>
+            <a:r>
+              <a:rPr lang="en-AU" dirty="0"/>
+              <a:t>Pattern Engine – DSL for structures, e.g. </a:t>
+            </a:r>
+            <a:r>
+              <a:rPr lang="en-AU" dirty="0" err="1"/>
+              <a:t>ChatScript</a:t>
+            </a:r>
+            <a:endParaRPr lang="en-AU" dirty="0"/>
+          </a:p>
+          <a:p>
+            <a:endParaRPr lang="en-AU" dirty="0"/>
+          </a:p>
+          <a:p>
+            <a:endParaRPr lang="en-AU" dirty="0"/>
+          </a:p>
+        </p:txBody>
+      </p:sp>
+      <p:sp>
+        <p:nvSpPr>
+          <p:cNvPr id="4" name="Slide Number Placeholder 3"/>
+          <p:cNvSpPr>
+            <a:spLocks noGrp="1"/>
+          </p:cNvSpPr>
+          <p:nvPr>
+            <p:ph type="sldNum" sz="quarter" idx="10"/>
+          </p:nvPr>
+        </p:nvSpPr>
+        <p:spPr/>
+        <p:txBody>
+          <a:bodyPr/>
+          <a:lstStyle/>
+          <a:p>
+            <a:fld id="{B0963970-F77D-4550-9FC6-19F442B9E04B}" type="slidenum">
+              <a:rPr lang="en-AU" smtClean="0"/>
+              <a:t>28</a:t>
+            </a:fld>
+            <a:endParaRPr lang="en-AU"/>
+          </a:p>
+        </p:txBody>
+      </p:sp>
+    </p:spTree>
+    <p:extLst>
+      <p:ext uri="{BB962C8B-B14F-4D97-AF65-F5344CB8AC3E}">
+        <p14:creationId xmlns:p14="http://schemas.microsoft.com/office/powerpoint/2010/main" val="1832964778"/>
       </p:ext>
     </p:extLst>
   </p:cSld>
@@ -5759,7 +6067,9 @@
         </p:nvSpPr>
         <p:spPr/>
         <p:txBody>
-          <a:bodyPr/>
+          <a:bodyPr>
+            <a:normAutofit lnSpcReduction="10000"/>
+          </a:bodyPr>
           <a:lstStyle/>
           <a:p>
             <a:r>
@@ -5773,24 +6083,32 @@
           <a:p>
             <a:r>
               <a:rPr lang="en-AU" dirty="0"/>
+              <a:t>Discovering user’s “intent”</a:t>
+            </a:r>
+          </a:p>
+          <a:p>
+            <a:pPr lvl="1"/>
+            <a:r>
+              <a:rPr lang="en-AU" dirty="0"/>
+              <a:t>Named Entity Recognition</a:t>
+            </a:r>
+          </a:p>
+          <a:p>
+            <a:pPr lvl="1"/>
+            <a:endParaRPr lang="en-AU" dirty="0"/>
+          </a:p>
+          <a:p>
+            <a:endParaRPr lang="en-AU" dirty="0"/>
+          </a:p>
+          <a:p>
+            <a:r>
+              <a:rPr lang="en-AU" dirty="0"/>
               <a:t>Provided as a Service</a:t>
             </a:r>
           </a:p>
           <a:p>
+            <a:pPr lvl="1"/>
             <a:endParaRPr lang="en-AU" dirty="0"/>
-          </a:p>
-          <a:p>
-            <a:r>
-              <a:rPr lang="en-AU" dirty="0"/>
-              <a:t>Allows definition of custom language models</a:t>
-            </a:r>
-          </a:p>
-          <a:p>
-            <a:pPr lvl="1"/>
-            <a:r>
-              <a:rPr lang="en-AU" dirty="0"/>
-              <a:t>Extracts entities and intent from user input</a:t>
-            </a:r>
           </a:p>
           <a:p>
             <a:pPr lvl="1"/>
@@ -5916,6 +6234,156 @@
           <p:cNvPr id="2" name="Title 1">
             <a:extLst>
               <a:ext uri="{FF2B5EF4-FFF2-40B4-BE49-F238E27FC236}">
+                <a16:creationId xmlns:a16="http://schemas.microsoft.com/office/drawing/2014/main" id="{321C3EC8-2D88-4C5F-957F-471D41346A80}"/>
+              </a:ext>
+            </a:extLst>
+          </p:cNvPr>
+          <p:cNvSpPr>
+            <a:spLocks noGrp="1"/>
+          </p:cNvSpPr>
+          <p:nvPr>
+            <p:ph type="title"/>
+          </p:nvPr>
+        </p:nvSpPr>
+        <p:spPr/>
+        <p:txBody>
+          <a:bodyPr/>
+          <a:lstStyle/>
+          <a:p>
+            <a:r>
+              <a:rPr lang="en-AU" dirty="0"/>
+              <a:t>Traditional NLP “pipeline”</a:t>
+            </a:r>
+          </a:p>
+        </p:txBody>
+      </p:sp>
+      <p:sp>
+        <p:nvSpPr>
+          <p:cNvPr id="3" name="Content Placeholder 2">
+            <a:extLst>
+              <a:ext uri="{FF2B5EF4-FFF2-40B4-BE49-F238E27FC236}">
+                <a16:creationId xmlns:a16="http://schemas.microsoft.com/office/drawing/2014/main" id="{6BDD478C-6310-42E1-AD0F-8309EF40B0FC}"/>
+              </a:ext>
+            </a:extLst>
+          </p:cNvPr>
+          <p:cNvSpPr>
+            <a:spLocks noGrp="1"/>
+          </p:cNvSpPr>
+          <p:nvPr>
+            <p:ph idx="1"/>
+          </p:nvPr>
+        </p:nvSpPr>
+        <p:spPr/>
+        <p:txBody>
+          <a:bodyPr/>
+          <a:lstStyle/>
+          <a:p>
+            <a:pPr marL="514350" indent="-514350">
+              <a:buFont typeface="+mj-lt"/>
+              <a:buAutoNum type="arabicPeriod"/>
+            </a:pPr>
+            <a:r>
+              <a:rPr lang="en-AU" dirty="0"/>
+              <a:t>Spellcheck</a:t>
+            </a:r>
+          </a:p>
+          <a:p>
+            <a:pPr marL="514350" indent="-514350">
+              <a:buFont typeface="+mj-lt"/>
+              <a:buAutoNum type="arabicPeriod"/>
+            </a:pPr>
+            <a:r>
+              <a:rPr lang="en-AU" dirty="0"/>
+              <a:t>Split into sentences &amp; words</a:t>
+            </a:r>
+          </a:p>
+          <a:p>
+            <a:pPr marL="514350" indent="-514350">
+              <a:buFont typeface="+mj-lt"/>
+              <a:buAutoNum type="arabicPeriod"/>
+            </a:pPr>
+            <a:r>
+              <a:rPr lang="en-AU" dirty="0"/>
+              <a:t>Parts of Speech Tagging</a:t>
+            </a:r>
+          </a:p>
+          <a:p>
+            <a:pPr marL="514350" indent="-514350">
+              <a:buFont typeface="+mj-lt"/>
+              <a:buAutoNum type="arabicPeriod"/>
+            </a:pPr>
+            <a:r>
+              <a:rPr lang="en-AU" dirty="0"/>
+              <a:t>Lemmatization (or stemming)</a:t>
+            </a:r>
+          </a:p>
+          <a:p>
+            <a:pPr marL="514350" indent="-514350">
+              <a:buFont typeface="+mj-lt"/>
+              <a:buAutoNum type="arabicPeriod"/>
+            </a:pPr>
+            <a:r>
+              <a:rPr lang="en-AU" dirty="0"/>
+              <a:t>Entity Recognition</a:t>
+            </a:r>
+          </a:p>
+          <a:p>
+            <a:pPr marL="514350" indent="-514350">
+              <a:buFont typeface="+mj-lt"/>
+              <a:buAutoNum type="arabicPeriod"/>
+            </a:pPr>
+            <a:r>
+              <a:rPr lang="en-AU" dirty="0"/>
+              <a:t>Concept Recognition</a:t>
+            </a:r>
+          </a:p>
+          <a:p>
+            <a:pPr marL="514350" indent="-514350">
+              <a:buFont typeface="+mj-lt"/>
+              <a:buAutoNum type="arabicPeriod"/>
+            </a:pPr>
+            <a:r>
+              <a:rPr lang="en-AU" dirty="0"/>
+              <a:t>Pattern Engine</a:t>
+            </a:r>
+          </a:p>
+        </p:txBody>
+      </p:sp>
+    </p:spTree>
+    <p:extLst>
+      <p:ext uri="{BB962C8B-B14F-4D97-AF65-F5344CB8AC3E}">
+        <p14:creationId xmlns:p14="http://schemas.microsoft.com/office/powerpoint/2010/main" val="653830368"/>
+      </p:ext>
+    </p:extLst>
+  </p:cSld>
+  <p:clrMapOvr>
+    <a:masterClrMapping/>
+  </p:clrMapOvr>
+</p:sld>
+</file>
+
+<file path=ppt/slides/slide29.xml><?xml version="1.0" encoding="utf-8"?>
+<p:sld xmlns:a="http://schemas.openxmlformats.org/drawingml/2006/main" xmlns:r="http://schemas.openxmlformats.org/officeDocument/2006/relationships" xmlns:p="http://schemas.openxmlformats.org/presentationml/2006/main">
+  <p:cSld>
+    <p:spTree>
+      <p:nvGrpSpPr>
+        <p:cNvPr id="1" name=""/>
+        <p:cNvGrpSpPr/>
+        <p:nvPr/>
+      </p:nvGrpSpPr>
+      <p:grpSpPr>
+        <a:xfrm>
+          <a:off x="0" y="0"/>
+          <a:ext cx="0" cy="0"/>
+          <a:chOff x="0" y="0"/>
+          <a:chExt cx="0" cy="0"/>
+        </a:xfrm>
+      </p:grpSpPr>
+      <p:sp>
+        <p:nvSpPr>
+          <p:cNvPr id="2" name="Title 1">
+            <a:extLst>
+              <a:ext uri="{FF2B5EF4-FFF2-40B4-BE49-F238E27FC236}">
                 <a16:creationId xmlns:a16="http://schemas.microsoft.com/office/drawing/2014/main" id="{F3F58C56-5DBB-4010-976D-4A230BC01E08}"/>
               </a:ext>
             </a:extLst>
@@ -6058,7 +6526,7 @@
         </p:spPr>
         <p:txBody>
           <a:bodyPr vert="horz" lIns="91440" tIns="45720" rIns="91440" bIns="45720" rtlCol="0" anchor="t">
-            <a:normAutofit fontScale="85000" lnSpcReduction="20000"/>
+            <a:normAutofit fontScale="77500" lnSpcReduction="20000"/>
           </a:bodyPr>
           <a:lstStyle>
             <a:lvl1pPr marL="228600" indent="-228600" algn="l" defTabSz="914400" rtl="0" eaLnBrk="1" latinLnBrk="0" hangingPunct="1">
@@ -6269,7 +6737,10 @@
             <a:endParaRPr lang="en-AU" kern="0" dirty="0"/>
           </a:p>
           <a:p>
-            <a:endParaRPr lang="en-AU" kern="0" dirty="0"/>
+            <a:r>
+              <a:rPr lang="en-AU" kern="0" dirty="0"/>
+              <a:t>Update the keys specified by the #warning directives</a:t>
+            </a:r>
           </a:p>
           <a:p>
             <a:endParaRPr lang="en-AU" kern="0" dirty="0"/>
@@ -6284,12 +6755,23 @@
             <a:endParaRPr lang="en-AU" kern="0" dirty="0"/>
           </a:p>
           <a:p>
-            <a:pPr marL="0" indent="0">
-              <a:buNone/>
-            </a:pPr>
             <a:r>
               <a:rPr lang="en-AU" sz="1600" kern="0" dirty="0"/>
-              <a:t>* Use LUIS to identify intents for each step</a:t>
+              <a:t>Use </a:t>
+            </a:r>
+            <a:r>
+              <a:rPr lang="en-AU" sz="1600" kern="0" dirty="0" err="1"/>
+              <a:t>QnA</a:t>
+            </a:r>
+            <a:r>
+              <a:rPr lang="en-AU" sz="1600" kern="0" dirty="0"/>
+              <a:t> Maker for 1 &amp; 2</a:t>
+            </a:r>
+          </a:p>
+          <a:p>
+            <a:r>
+              <a:rPr lang="en-AU" sz="1600" kern="0" dirty="0"/>
+              <a:t>Use LUIS for 3</a:t>
             </a:r>
           </a:p>
           <a:p>
@@ -6307,131 +6789,6 @@
     <p:extLst>
       <p:ext uri="{BB962C8B-B14F-4D97-AF65-F5344CB8AC3E}">
         <p14:creationId xmlns:p14="http://schemas.microsoft.com/office/powerpoint/2010/main" val="3240403607"/>
-      </p:ext>
-    </p:extLst>
-  </p:cSld>
-  <p:clrMapOvr>
-    <a:masterClrMapping/>
-  </p:clrMapOvr>
-</p:sld>
-</file>
-
-<file path=ppt/slides/slide29.xml><?xml version="1.0" encoding="utf-8"?>
-<p:sld xmlns:a="http://schemas.openxmlformats.org/drawingml/2006/main" xmlns:r="http://schemas.openxmlformats.org/officeDocument/2006/relationships" xmlns:p="http://schemas.openxmlformats.org/presentationml/2006/main">
-  <p:cSld>
-    <p:spTree>
-      <p:nvGrpSpPr>
-        <p:cNvPr id="1" name=""/>
-        <p:cNvGrpSpPr/>
-        <p:nvPr/>
-      </p:nvGrpSpPr>
-      <p:grpSpPr>
-        <a:xfrm>
-          <a:off x="0" y="0"/>
-          <a:ext cx="0" cy="0"/>
-          <a:chOff x="0" y="0"/>
-          <a:chExt cx="0" cy="0"/>
-        </a:xfrm>
-      </p:grpSpPr>
-      <p:sp>
-        <p:nvSpPr>
-          <p:cNvPr id="5" name="Title 4">
-            <a:extLst>
-              <a:ext uri="{FF2B5EF4-FFF2-40B4-BE49-F238E27FC236}">
-                <a16:creationId xmlns:a16="http://schemas.microsoft.com/office/drawing/2014/main" id="{934140FD-B6C8-4C68-8F26-7DB96D0333E8}"/>
-              </a:ext>
-            </a:extLst>
-          </p:cNvPr>
-          <p:cNvSpPr>
-            <a:spLocks noGrp="1"/>
-          </p:cNvSpPr>
-          <p:nvPr>
-            <p:ph type="title"/>
-          </p:nvPr>
-        </p:nvSpPr>
-        <p:spPr/>
-        <p:txBody>
-          <a:bodyPr/>
-          <a:lstStyle/>
-          <a:p>
-            <a:r>
-              <a:rPr lang="en-AU" dirty="0"/>
-              <a:t>1. Tell a Q/A Joke</a:t>
-            </a:r>
-          </a:p>
-        </p:txBody>
-      </p:sp>
-      <p:sp>
-        <p:nvSpPr>
-          <p:cNvPr id="6" name="Content Placeholder 5">
-            <a:extLst>
-              <a:ext uri="{FF2B5EF4-FFF2-40B4-BE49-F238E27FC236}">
-                <a16:creationId xmlns:a16="http://schemas.microsoft.com/office/drawing/2014/main" id="{C1F6B9B1-7ACF-475E-91B0-FF2EB8CAEFE8}"/>
-              </a:ext>
-            </a:extLst>
-          </p:cNvPr>
-          <p:cNvSpPr>
-            <a:spLocks noGrp="1"/>
-          </p:cNvSpPr>
-          <p:nvPr>
-            <p:ph idx="1"/>
-          </p:nvPr>
-        </p:nvSpPr>
-        <p:spPr/>
-        <p:txBody>
-          <a:bodyPr/>
-          <a:lstStyle/>
-          <a:p>
-            <a:r>
-              <a:rPr lang="en-AU" dirty="0"/>
-              <a:t>Create LUIS Intent and publish model</a:t>
-            </a:r>
-          </a:p>
-          <a:p>
-            <a:endParaRPr lang="en-AU" dirty="0"/>
-          </a:p>
-          <a:p>
-            <a:r>
-              <a:rPr lang="en-AU" dirty="0"/>
-              <a:t>Update </a:t>
-            </a:r>
-            <a:r>
-              <a:rPr lang="en-AU" dirty="0" err="1"/>
-              <a:t>ConferenceRootDialog</a:t>
-            </a:r>
-            <a:r>
-              <a:rPr lang="en-AU" dirty="0"/>
-              <a:t> with your LUIS keys</a:t>
-            </a:r>
-          </a:p>
-          <a:p>
-            <a:endParaRPr lang="en-AU" dirty="0"/>
-          </a:p>
-          <a:p>
-            <a:r>
-              <a:rPr lang="en-AU" dirty="0"/>
-              <a:t>Create Joke Dialog</a:t>
-            </a:r>
-          </a:p>
-          <a:p>
-            <a:endParaRPr lang="en-AU" dirty="0"/>
-          </a:p>
-          <a:p>
-            <a:r>
-              <a:rPr lang="en-AU" dirty="0" err="1"/>
-              <a:t>Context.Call</a:t>
-            </a:r>
-            <a:r>
-              <a:rPr lang="en-AU" dirty="0"/>
-              <a:t> your Dialog</a:t>
-            </a:r>
-          </a:p>
-        </p:txBody>
-      </p:sp>
-    </p:spTree>
-    <p:extLst>
-      <p:ext uri="{BB962C8B-B14F-4D97-AF65-F5344CB8AC3E}">
-        <p14:creationId xmlns:p14="http://schemas.microsoft.com/office/powerpoint/2010/main" val="3886039999"/>
       </p:ext>
     </p:extLst>
   </p:cSld>
@@ -6536,6 +6893,131 @@
     <p:extLst>
       <p:ext uri="{BB962C8B-B14F-4D97-AF65-F5344CB8AC3E}">
         <p14:creationId xmlns:p14="http://schemas.microsoft.com/office/powerpoint/2010/main" val="3574279519"/>
+      </p:ext>
+    </p:extLst>
+  </p:cSld>
+  <p:clrMapOvr>
+    <a:masterClrMapping/>
+  </p:clrMapOvr>
+</p:sld>
+</file>
+
+<file path=ppt/slides/slide30.xml><?xml version="1.0" encoding="utf-8"?>
+<p:sld xmlns:a="http://schemas.openxmlformats.org/drawingml/2006/main" xmlns:r="http://schemas.openxmlformats.org/officeDocument/2006/relationships" xmlns:p="http://schemas.openxmlformats.org/presentationml/2006/main">
+  <p:cSld>
+    <p:spTree>
+      <p:nvGrpSpPr>
+        <p:cNvPr id="1" name=""/>
+        <p:cNvGrpSpPr/>
+        <p:nvPr/>
+      </p:nvGrpSpPr>
+      <p:grpSpPr>
+        <a:xfrm>
+          <a:off x="0" y="0"/>
+          <a:ext cx="0" cy="0"/>
+          <a:chOff x="0" y="0"/>
+          <a:chExt cx="0" cy="0"/>
+        </a:xfrm>
+      </p:grpSpPr>
+      <p:sp>
+        <p:nvSpPr>
+          <p:cNvPr id="5" name="Title 4">
+            <a:extLst>
+              <a:ext uri="{FF2B5EF4-FFF2-40B4-BE49-F238E27FC236}">
+                <a16:creationId xmlns:a16="http://schemas.microsoft.com/office/drawing/2014/main" id="{934140FD-B6C8-4C68-8F26-7DB96D0333E8}"/>
+              </a:ext>
+            </a:extLst>
+          </p:cNvPr>
+          <p:cNvSpPr>
+            <a:spLocks noGrp="1"/>
+          </p:cNvSpPr>
+          <p:nvPr>
+            <p:ph type="title"/>
+          </p:nvPr>
+        </p:nvSpPr>
+        <p:spPr/>
+        <p:txBody>
+          <a:bodyPr/>
+          <a:lstStyle/>
+          <a:p>
+            <a:r>
+              <a:rPr lang="en-AU" dirty="0"/>
+              <a:t>3. Tell a Q/A Joke</a:t>
+            </a:r>
+          </a:p>
+        </p:txBody>
+      </p:sp>
+      <p:sp>
+        <p:nvSpPr>
+          <p:cNvPr id="6" name="Content Placeholder 5">
+            <a:extLst>
+              <a:ext uri="{FF2B5EF4-FFF2-40B4-BE49-F238E27FC236}">
+                <a16:creationId xmlns:a16="http://schemas.microsoft.com/office/drawing/2014/main" id="{C1F6B9B1-7ACF-475E-91B0-FF2EB8CAEFE8}"/>
+              </a:ext>
+            </a:extLst>
+          </p:cNvPr>
+          <p:cNvSpPr>
+            <a:spLocks noGrp="1"/>
+          </p:cNvSpPr>
+          <p:nvPr>
+            <p:ph idx="1"/>
+          </p:nvPr>
+        </p:nvSpPr>
+        <p:spPr/>
+        <p:txBody>
+          <a:bodyPr/>
+          <a:lstStyle/>
+          <a:p>
+            <a:r>
+              <a:rPr lang="en-AU" dirty="0"/>
+              <a:t>Create LUIS Intent and publish model</a:t>
+            </a:r>
+          </a:p>
+          <a:p>
+            <a:endParaRPr lang="en-AU" dirty="0"/>
+          </a:p>
+          <a:p>
+            <a:r>
+              <a:rPr lang="en-AU" dirty="0"/>
+              <a:t>Update </a:t>
+            </a:r>
+            <a:r>
+              <a:rPr lang="en-AU" dirty="0" err="1"/>
+              <a:t>ConferenceRootDialog</a:t>
+            </a:r>
+            <a:r>
+              <a:rPr lang="en-AU" dirty="0"/>
+              <a:t> with your LUIS keys</a:t>
+            </a:r>
+          </a:p>
+          <a:p>
+            <a:endParaRPr lang="en-AU" dirty="0"/>
+          </a:p>
+          <a:p>
+            <a:r>
+              <a:rPr lang="en-AU" dirty="0"/>
+              <a:t>Create Joke Dialog</a:t>
+            </a:r>
+          </a:p>
+          <a:p>
+            <a:endParaRPr lang="en-AU" dirty="0"/>
+          </a:p>
+          <a:p>
+            <a:r>
+              <a:rPr lang="en-AU" dirty="0" err="1"/>
+              <a:t>Context.Call</a:t>
+            </a:r>
+            <a:r>
+              <a:rPr lang="en-AU" dirty="0"/>
+              <a:t> your Dialog</a:t>
+            </a:r>
+          </a:p>
+        </p:txBody>
+      </p:sp>
+    </p:spTree>
+    <p:extLst>
+      <p:ext uri="{BB962C8B-B14F-4D97-AF65-F5344CB8AC3E}">
+        <p14:creationId xmlns:p14="http://schemas.microsoft.com/office/powerpoint/2010/main" val="3886039999"/>
       </p:ext>
     </p:extLst>
   </p:cSld>

</xml_diff>